<commit_message>
updated synchronization slide and homework
</commit_message>
<xml_diff>
--- a/docs/03_Synchronization.pptx
+++ b/docs/03_Synchronization.pptx
@@ -8915,7 +8915,7 @@
           <a:p>
             <a:fld id="{6AD6EE87-EBD5-4F12-A48A-63ACA297AC8F}" type="datetimeFigureOut">
               <a:rPr lang="en-US" dirty="0"/>
-              <a:t>10/7/2018</a:t>
+              <a:t>10/8/2018</a:t>
             </a:fld>
             <a:endParaRPr lang="en-US" dirty="0"/>
           </a:p>
@@ -9117,7 +9117,7 @@
           <a:p>
             <a:fld id="{4CD73815-2707-4475-8F1A-B873CB631BB4}" type="datetimeFigureOut">
               <a:rPr lang="en-US" dirty="0"/>
-              <a:t>10/7/2018</a:t>
+              <a:t>10/8/2018</a:t>
             </a:fld>
             <a:endParaRPr lang="en-US" dirty="0"/>
           </a:p>
@@ -9292,7 +9292,7 @@
           <a:p>
             <a:fld id="{2A4AFB99-0EAB-4182-AFF8-E214C82A68F6}" type="datetimeFigureOut">
               <a:rPr lang="en-US" dirty="0"/>
-              <a:t>10/7/2018</a:t>
+              <a:t>10/8/2018</a:t>
             </a:fld>
             <a:endParaRPr lang="en-US" dirty="0"/>
           </a:p>
@@ -9492,7 +9492,7 @@
           <a:p>
             <a:fld id="{A5D3794B-289A-4A80-97D7-111025398D45}" type="datetimeFigureOut">
               <a:rPr lang="en-US" dirty="0"/>
-              <a:t>10/7/2018</a:t>
+              <a:t>10/8/2018</a:t>
             </a:fld>
             <a:endParaRPr lang="en-US" dirty="0"/>
           </a:p>
@@ -18385,7 +18385,7 @@
           <a:p>
             <a:fld id="{5A61015F-7CC6-4D0A-9D87-873EA4C304CC}" type="datetimeFigureOut">
               <a:rPr lang="en-US" dirty="0"/>
-              <a:t>10/7/2018</a:t>
+              <a:t>10/8/2018</a:t>
             </a:fld>
             <a:endParaRPr lang="en-US" dirty="0"/>
           </a:p>
@@ -18654,7 +18654,7 @@
           <a:p>
             <a:fld id="{93C6A301-0538-44EC-B09D-202E1042A48B}" type="datetimeFigureOut">
               <a:rPr lang="en-US" dirty="0"/>
-              <a:t>10/7/2018</a:t>
+              <a:t>10/8/2018</a:t>
             </a:fld>
             <a:endParaRPr lang="en-US" dirty="0"/>
           </a:p>
@@ -19047,7 +19047,7 @@
           <a:p>
             <a:fld id="{D789574A-8875-45EF-8EA2-3CAA0F7ABC4C}" type="datetimeFigureOut">
               <a:rPr lang="en-US" dirty="0"/>
-              <a:t>10/7/2018</a:t>
+              <a:t>10/8/2018</a:t>
             </a:fld>
             <a:endParaRPr lang="en-US" dirty="0"/>
           </a:p>
@@ -19160,7 +19160,7 @@
           <a:p>
             <a:fld id="{67EF4D4C-5367-4C26-9E2B-D8088D7FCA81}" type="datetimeFigureOut">
               <a:rPr lang="en-US" dirty="0"/>
-              <a:t>10/7/2018</a:t>
+              <a:t>10/8/2018</a:t>
             </a:fld>
             <a:endParaRPr lang="en-US" dirty="0"/>
           </a:p>
@@ -19250,7 +19250,7 @@
           <a:p>
             <a:fld id="{56E91E96-98B0-4413-9547-46F3504108EF}" type="datetimeFigureOut">
               <a:rPr lang="en-US" dirty="0"/>
-              <a:t>10/7/2018</a:t>
+              <a:t>10/8/2018</a:t>
             </a:fld>
             <a:endParaRPr lang="en-US" dirty="0"/>
           </a:p>
@@ -19535,7 +19535,7 @@
           <a:p>
             <a:fld id="{05C68B11-C5A8-448C-8CE9-B1A273C79CFC}" type="datetimeFigureOut">
               <a:rPr lang="en-US" dirty="0"/>
-              <a:t>10/7/2018</a:t>
+              <a:t>10/8/2018</a:t>
             </a:fld>
             <a:endParaRPr lang="en-US" dirty="0"/>
           </a:p>
@@ -19810,7 +19810,7 @@
           <a:p>
             <a:fld id="{C7616CA0-919D-4A49-9C8A-62FDFB3A5183}" type="datetimeFigureOut">
               <a:rPr lang="en-US" dirty="0"/>
-              <a:t>10/7/2018</a:t>
+              <a:t>10/8/2018</a:t>
             </a:fld>
             <a:endParaRPr lang="en-US" dirty="0"/>
           </a:p>
@@ -20056,7 +20056,7 @@
             <a:fld id="{90298CD5-6C1E-4009-B41F-6DF62E31D3BE}" type="datetimeFigureOut">
               <a:rPr lang="en-US" dirty="0"/>
               <a:pPr/>
-              <a:t>10/7/2018</a:t>
+              <a:t>10/8/2018</a:t>
             </a:fld>
             <a:endParaRPr lang="en-US" dirty="0"/>
           </a:p>
@@ -21003,7 +21003,7 @@
         <p:spPr/>
         <p:txBody>
           <a:bodyPr>
-            <a:normAutofit fontScale="92500" lnSpcReduction="10000"/>
+            <a:normAutofit fontScale="92500" lnSpcReduction="20000"/>
           </a:bodyPr>
           <a:lstStyle/>
           <a:p>
@@ -21056,7 +21056,7 @@
           <a:p>
             <a:r>
               <a:rPr lang="en-US" dirty="0"/>
-              <a:t>Condition Variables can be reused and can have multiple Consumers waiting</a:t>
+              <a:t>Condition Variables can be reused and can have multiple Consumers waiting and/or multiple Producers notifying</a:t>
             </a:r>
           </a:p>
         </p:txBody>
@@ -21601,6 +21601,13 @@
             <a:r>
               <a:rPr lang="en-US" dirty="0"/>
               <a:t> via share()</a:t>
+            </a:r>
+          </a:p>
+          <a:p>
+            <a:pPr lvl="1"/>
+            <a:r>
+              <a:rPr lang="en-US" dirty="0"/>
+              <a:t>Original future becomes invalid</a:t>
             </a:r>
           </a:p>
           <a:p>

</xml_diff>